<commit_message>
UI für UC 110-17
in balsamique, word, pptx
</commit_message>
<xml_diff>
--- a/1_Präsentationen/SWE_BlueCouch_Anforderungsanalyse_v1.7.pptx
+++ b/1_Präsentationen/SWE_BlueCouch_Anforderungsanalyse_v1.7.pptx
@@ -5,15 +5,19 @@
     <p:sldMasterId id="2147483648" r:id="rId1"/>
   </p:sldMasterIdLst>
   <p:notesMasterIdLst>
-    <p:notesMasterId r:id="rId5"/>
+    <p:notesMasterId r:id="rId9"/>
   </p:notesMasterIdLst>
   <p:handoutMasterIdLst>
-    <p:handoutMasterId r:id="rId6"/>
+    <p:handoutMasterId r:id="rId10"/>
   </p:handoutMasterIdLst>
   <p:sldIdLst>
     <p:sldId id="260" r:id="rId2"/>
     <p:sldId id="316" r:id="rId3"/>
-    <p:sldId id="317" r:id="rId4"/>
+    <p:sldId id="322" r:id="rId4"/>
+    <p:sldId id="321" r:id="rId5"/>
+    <p:sldId id="320" r:id="rId6"/>
+    <p:sldId id="319" r:id="rId7"/>
+    <p:sldId id="318" r:id="rId8"/>
   </p:sldIdLst>
   <p:sldSz cx="10080625" cy="6840538"/>
   <p:notesSz cx="7099300" cy="10236200"/>
@@ -1060,7 +1064,7 @@
           </a:bodyPr>
           <a:lstStyle/>
           <a:p>
-            <a:endParaRPr lang="de-AT" dirty="0"/>
+            <a:endParaRPr lang="de-AT" sz="1000" dirty="0"/>
           </a:p>
         </p:txBody>
       </p:sp>
@@ -1096,7 +1100,375 @@
     </p:spTree>
     <p:extLst>
       <p:ext uri="{BB962C8B-B14F-4D97-AF65-F5344CB8AC3E}">
-        <p14:creationId xmlns:p14="http://schemas.microsoft.com/office/powerpoint/2010/main" val="3065861317"/>
+        <p14:creationId xmlns:p14="http://schemas.microsoft.com/office/powerpoint/2010/main" val="3130299606"/>
+      </p:ext>
+    </p:extLst>
+  </p:cSld>
+  <p:clrMapOvr>
+    <a:masterClrMapping/>
+  </p:clrMapOvr>
+</p:notes>
+</file>
+
+<file path=ppt/notesSlides/notesSlide4.xml><?xml version="1.0" encoding="utf-8"?>
+<p:notes xmlns:a="http://schemas.openxmlformats.org/drawingml/2006/main" xmlns:r="http://schemas.openxmlformats.org/officeDocument/2006/relationships" xmlns:p="http://schemas.openxmlformats.org/presentationml/2006/main">
+  <p:cSld>
+    <p:spTree>
+      <p:nvGrpSpPr>
+        <p:cNvPr id="1" name=""/>
+        <p:cNvGrpSpPr/>
+        <p:nvPr/>
+      </p:nvGrpSpPr>
+      <p:grpSpPr>
+        <a:xfrm>
+          <a:off x="0" y="0"/>
+          <a:ext cx="0" cy="0"/>
+          <a:chOff x="0" y="0"/>
+          <a:chExt cx="0" cy="0"/>
+        </a:xfrm>
+      </p:grpSpPr>
+      <p:sp>
+        <p:nvSpPr>
+          <p:cNvPr id="2" name="Folienbildplatzhalter 1"/>
+          <p:cNvSpPr>
+            <a:spLocks noGrp="1" noRot="1" noChangeAspect="1"/>
+          </p:cNvSpPr>
+          <p:nvPr>
+            <p:ph type="sldImg"/>
+          </p:nvPr>
+        </p:nvSpPr>
+        <p:spPr/>
+      </p:sp>
+      <p:sp>
+        <p:nvSpPr>
+          <p:cNvPr id="3" name="Notizenplatzhalter 2"/>
+          <p:cNvSpPr>
+            <a:spLocks noGrp="1"/>
+          </p:cNvSpPr>
+          <p:nvPr>
+            <p:ph type="body" idx="1"/>
+          </p:nvPr>
+        </p:nvSpPr>
+        <p:spPr/>
+        <p:txBody>
+          <a:bodyPr>
+            <a:normAutofit/>
+          </a:bodyPr>
+          <a:lstStyle/>
+          <a:p>
+            <a:endParaRPr lang="de-AT" sz="1000" dirty="0"/>
+          </a:p>
+        </p:txBody>
+      </p:sp>
+      <p:sp>
+        <p:nvSpPr>
+          <p:cNvPr id="4" name="Foliennummernplatzhalter 3"/>
+          <p:cNvSpPr>
+            <a:spLocks noGrp="1"/>
+          </p:cNvSpPr>
+          <p:nvPr>
+            <p:ph type="sldNum" sz="quarter" idx="10"/>
+          </p:nvPr>
+        </p:nvSpPr>
+        <p:spPr/>
+        <p:txBody>
+          <a:bodyPr/>
+          <a:lstStyle/>
+          <a:p>
+            <a:pPr>
+              <a:defRPr/>
+            </a:pPr>
+            <a:fld id="{421AED61-8A9E-4389-91ED-021CAF5693A5}" type="slidenum">
+              <a:rPr lang="de-AT" smtClean="0"/>
+              <a:pPr>
+                <a:defRPr/>
+              </a:pPr>
+              <a:t>4</a:t>
+            </a:fld>
+            <a:endParaRPr lang="de-AT"/>
+          </a:p>
+        </p:txBody>
+      </p:sp>
+    </p:spTree>
+    <p:extLst>
+      <p:ext uri="{BB962C8B-B14F-4D97-AF65-F5344CB8AC3E}">
+        <p14:creationId xmlns:p14="http://schemas.microsoft.com/office/powerpoint/2010/main" val="2336642544"/>
+      </p:ext>
+    </p:extLst>
+  </p:cSld>
+  <p:clrMapOvr>
+    <a:masterClrMapping/>
+  </p:clrMapOvr>
+</p:notes>
+</file>
+
+<file path=ppt/notesSlides/notesSlide5.xml><?xml version="1.0" encoding="utf-8"?>
+<p:notes xmlns:a="http://schemas.openxmlformats.org/drawingml/2006/main" xmlns:r="http://schemas.openxmlformats.org/officeDocument/2006/relationships" xmlns:p="http://schemas.openxmlformats.org/presentationml/2006/main">
+  <p:cSld>
+    <p:spTree>
+      <p:nvGrpSpPr>
+        <p:cNvPr id="1" name=""/>
+        <p:cNvGrpSpPr/>
+        <p:nvPr/>
+      </p:nvGrpSpPr>
+      <p:grpSpPr>
+        <a:xfrm>
+          <a:off x="0" y="0"/>
+          <a:ext cx="0" cy="0"/>
+          <a:chOff x="0" y="0"/>
+          <a:chExt cx="0" cy="0"/>
+        </a:xfrm>
+      </p:grpSpPr>
+      <p:sp>
+        <p:nvSpPr>
+          <p:cNvPr id="2" name="Folienbildplatzhalter 1"/>
+          <p:cNvSpPr>
+            <a:spLocks noGrp="1" noRot="1" noChangeAspect="1"/>
+          </p:cNvSpPr>
+          <p:nvPr>
+            <p:ph type="sldImg"/>
+          </p:nvPr>
+        </p:nvSpPr>
+        <p:spPr/>
+      </p:sp>
+      <p:sp>
+        <p:nvSpPr>
+          <p:cNvPr id="3" name="Notizenplatzhalter 2"/>
+          <p:cNvSpPr>
+            <a:spLocks noGrp="1"/>
+          </p:cNvSpPr>
+          <p:nvPr>
+            <p:ph type="body" idx="1"/>
+          </p:nvPr>
+        </p:nvSpPr>
+        <p:spPr/>
+        <p:txBody>
+          <a:bodyPr>
+            <a:normAutofit/>
+          </a:bodyPr>
+          <a:lstStyle/>
+          <a:p>
+            <a:endParaRPr lang="de-AT" sz="1000" dirty="0"/>
+          </a:p>
+        </p:txBody>
+      </p:sp>
+      <p:sp>
+        <p:nvSpPr>
+          <p:cNvPr id="4" name="Foliennummernplatzhalter 3"/>
+          <p:cNvSpPr>
+            <a:spLocks noGrp="1"/>
+          </p:cNvSpPr>
+          <p:nvPr>
+            <p:ph type="sldNum" sz="quarter" idx="10"/>
+          </p:nvPr>
+        </p:nvSpPr>
+        <p:spPr/>
+        <p:txBody>
+          <a:bodyPr/>
+          <a:lstStyle/>
+          <a:p>
+            <a:pPr>
+              <a:defRPr/>
+            </a:pPr>
+            <a:fld id="{421AED61-8A9E-4389-91ED-021CAF5693A5}" type="slidenum">
+              <a:rPr lang="de-AT" smtClean="0"/>
+              <a:pPr>
+                <a:defRPr/>
+              </a:pPr>
+              <a:t>5</a:t>
+            </a:fld>
+            <a:endParaRPr lang="de-AT"/>
+          </a:p>
+        </p:txBody>
+      </p:sp>
+    </p:spTree>
+    <p:extLst>
+      <p:ext uri="{BB962C8B-B14F-4D97-AF65-F5344CB8AC3E}">
+        <p14:creationId xmlns:p14="http://schemas.microsoft.com/office/powerpoint/2010/main" val="784002924"/>
+      </p:ext>
+    </p:extLst>
+  </p:cSld>
+  <p:clrMapOvr>
+    <a:masterClrMapping/>
+  </p:clrMapOvr>
+</p:notes>
+</file>
+
+<file path=ppt/notesSlides/notesSlide6.xml><?xml version="1.0" encoding="utf-8"?>
+<p:notes xmlns:a="http://schemas.openxmlformats.org/drawingml/2006/main" xmlns:r="http://schemas.openxmlformats.org/officeDocument/2006/relationships" xmlns:p="http://schemas.openxmlformats.org/presentationml/2006/main">
+  <p:cSld>
+    <p:spTree>
+      <p:nvGrpSpPr>
+        <p:cNvPr id="1" name=""/>
+        <p:cNvGrpSpPr/>
+        <p:nvPr/>
+      </p:nvGrpSpPr>
+      <p:grpSpPr>
+        <a:xfrm>
+          <a:off x="0" y="0"/>
+          <a:ext cx="0" cy="0"/>
+          <a:chOff x="0" y="0"/>
+          <a:chExt cx="0" cy="0"/>
+        </a:xfrm>
+      </p:grpSpPr>
+      <p:sp>
+        <p:nvSpPr>
+          <p:cNvPr id="2" name="Folienbildplatzhalter 1"/>
+          <p:cNvSpPr>
+            <a:spLocks noGrp="1" noRot="1" noChangeAspect="1"/>
+          </p:cNvSpPr>
+          <p:nvPr>
+            <p:ph type="sldImg"/>
+          </p:nvPr>
+        </p:nvSpPr>
+        <p:spPr/>
+      </p:sp>
+      <p:sp>
+        <p:nvSpPr>
+          <p:cNvPr id="3" name="Notizenplatzhalter 2"/>
+          <p:cNvSpPr>
+            <a:spLocks noGrp="1"/>
+          </p:cNvSpPr>
+          <p:nvPr>
+            <p:ph type="body" idx="1"/>
+          </p:nvPr>
+        </p:nvSpPr>
+        <p:spPr/>
+        <p:txBody>
+          <a:bodyPr>
+            <a:normAutofit/>
+          </a:bodyPr>
+          <a:lstStyle/>
+          <a:p>
+            <a:endParaRPr lang="de-AT" sz="1000" dirty="0"/>
+          </a:p>
+        </p:txBody>
+      </p:sp>
+      <p:sp>
+        <p:nvSpPr>
+          <p:cNvPr id="4" name="Foliennummernplatzhalter 3"/>
+          <p:cNvSpPr>
+            <a:spLocks noGrp="1"/>
+          </p:cNvSpPr>
+          <p:nvPr>
+            <p:ph type="sldNum" sz="quarter" idx="10"/>
+          </p:nvPr>
+        </p:nvSpPr>
+        <p:spPr/>
+        <p:txBody>
+          <a:bodyPr/>
+          <a:lstStyle/>
+          <a:p>
+            <a:pPr>
+              <a:defRPr/>
+            </a:pPr>
+            <a:fld id="{421AED61-8A9E-4389-91ED-021CAF5693A5}" type="slidenum">
+              <a:rPr lang="de-AT" smtClean="0"/>
+              <a:pPr>
+                <a:defRPr/>
+              </a:pPr>
+              <a:t>6</a:t>
+            </a:fld>
+            <a:endParaRPr lang="de-AT"/>
+          </a:p>
+        </p:txBody>
+      </p:sp>
+    </p:spTree>
+    <p:extLst>
+      <p:ext uri="{BB962C8B-B14F-4D97-AF65-F5344CB8AC3E}">
+        <p14:creationId xmlns:p14="http://schemas.microsoft.com/office/powerpoint/2010/main" val="316635278"/>
+      </p:ext>
+    </p:extLst>
+  </p:cSld>
+  <p:clrMapOvr>
+    <a:masterClrMapping/>
+  </p:clrMapOvr>
+</p:notes>
+</file>
+
+<file path=ppt/notesSlides/notesSlide7.xml><?xml version="1.0" encoding="utf-8"?>
+<p:notes xmlns:a="http://schemas.openxmlformats.org/drawingml/2006/main" xmlns:r="http://schemas.openxmlformats.org/officeDocument/2006/relationships" xmlns:p="http://schemas.openxmlformats.org/presentationml/2006/main">
+  <p:cSld>
+    <p:spTree>
+      <p:nvGrpSpPr>
+        <p:cNvPr id="1" name=""/>
+        <p:cNvGrpSpPr/>
+        <p:nvPr/>
+      </p:nvGrpSpPr>
+      <p:grpSpPr>
+        <a:xfrm>
+          <a:off x="0" y="0"/>
+          <a:ext cx="0" cy="0"/>
+          <a:chOff x="0" y="0"/>
+          <a:chExt cx="0" cy="0"/>
+        </a:xfrm>
+      </p:grpSpPr>
+      <p:sp>
+        <p:nvSpPr>
+          <p:cNvPr id="2" name="Folienbildplatzhalter 1"/>
+          <p:cNvSpPr>
+            <a:spLocks noGrp="1" noRot="1" noChangeAspect="1"/>
+          </p:cNvSpPr>
+          <p:nvPr>
+            <p:ph type="sldImg"/>
+          </p:nvPr>
+        </p:nvSpPr>
+        <p:spPr/>
+      </p:sp>
+      <p:sp>
+        <p:nvSpPr>
+          <p:cNvPr id="3" name="Notizenplatzhalter 2"/>
+          <p:cNvSpPr>
+            <a:spLocks noGrp="1"/>
+          </p:cNvSpPr>
+          <p:nvPr>
+            <p:ph type="body" idx="1"/>
+          </p:nvPr>
+        </p:nvSpPr>
+        <p:spPr/>
+        <p:txBody>
+          <a:bodyPr>
+            <a:normAutofit/>
+          </a:bodyPr>
+          <a:lstStyle/>
+          <a:p>
+            <a:endParaRPr lang="de-AT" sz="1000" dirty="0"/>
+          </a:p>
+        </p:txBody>
+      </p:sp>
+      <p:sp>
+        <p:nvSpPr>
+          <p:cNvPr id="4" name="Foliennummernplatzhalter 3"/>
+          <p:cNvSpPr>
+            <a:spLocks noGrp="1"/>
+          </p:cNvSpPr>
+          <p:nvPr>
+            <p:ph type="sldNum" sz="quarter" idx="10"/>
+          </p:nvPr>
+        </p:nvSpPr>
+        <p:spPr/>
+        <p:txBody>
+          <a:bodyPr/>
+          <a:lstStyle/>
+          <a:p>
+            <a:pPr>
+              <a:defRPr/>
+            </a:pPr>
+            <a:fld id="{421AED61-8A9E-4389-91ED-021CAF5693A5}" type="slidenum">
+              <a:rPr lang="de-AT" smtClean="0"/>
+              <a:pPr>
+                <a:defRPr/>
+              </a:pPr>
+              <a:t>7</a:t>
+            </a:fld>
+            <a:endParaRPr lang="de-AT"/>
+          </a:p>
+        </p:txBody>
+      </p:sp>
+    </p:spTree>
+    <p:extLst>
+      <p:ext uri="{BB962C8B-B14F-4D97-AF65-F5344CB8AC3E}">
+        <p14:creationId xmlns:p14="http://schemas.microsoft.com/office/powerpoint/2010/main" val="344023142"/>
       </p:ext>
     </p:extLst>
   </p:cSld>
@@ -3776,7 +4148,7 @@
         </p:nvSpPr>
         <p:spPr bwMode="auto">
           <a:xfrm>
-            <a:off x="4928619" y="4890789"/>
+            <a:off x="4933943" y="4890789"/>
             <a:ext cx="3960440" cy="1008112"/>
           </a:xfrm>
           <a:prstGeom prst="rect">
@@ -3884,74 +4256,6 @@
               <a:solidFill>
                 <a:schemeClr val="bg1"/>
               </a:solidFill>
-              <a:latin typeface="Calibri" panose="020F0502020204030204" pitchFamily="34" charset="0"/>
-            </a:endParaRPr>
-          </a:p>
-        </p:txBody>
-      </p:sp>
-      <p:sp>
-        <p:nvSpPr>
-          <p:cNvPr id="17" name="Wolkenförmige Legende 16"/>
-          <p:cNvSpPr/>
-          <p:nvPr/>
-        </p:nvSpPr>
-        <p:spPr>
-          <a:xfrm>
-            <a:off x="359792" y="220089"/>
-            <a:ext cx="6036031" cy="720080"/>
-          </a:xfrm>
-          <a:prstGeom prst="cloudCallout">
-            <a:avLst>
-              <a:gd name="adj1" fmla="val 11723"/>
-              <a:gd name="adj2" fmla="val 89648"/>
-            </a:avLst>
-          </a:prstGeom>
-          <a:solidFill>
-            <a:srgbClr val="99FF99"/>
-          </a:solidFill>
-        </p:spPr>
-        <p:style>
-          <a:lnRef idx="2">
-            <a:schemeClr val="accent1">
-              <a:shade val="50000"/>
-            </a:schemeClr>
-          </a:lnRef>
-          <a:fillRef idx="1">
-            <a:schemeClr val="accent1"/>
-          </a:fillRef>
-          <a:effectRef idx="0">
-            <a:schemeClr val="accent1"/>
-          </a:effectRef>
-          <a:fontRef idx="minor">
-            <a:schemeClr val="lt1"/>
-          </a:fontRef>
-        </p:style>
-        <p:txBody>
-          <a:bodyPr rtlCol="0" anchor="ctr"/>
-          <a:lstStyle/>
-          <a:p>
-            <a:pPr algn="ctr"/>
-            <a:r>
-              <a:rPr lang="de-DE" sz="2800" b="1" dirty="0" smtClean="0">
-                <a:effectLst>
-                  <a:outerShdw blurRad="38100" dist="38100" dir="2700000" algn="tl">
-                    <a:srgbClr val="000000">
-                      <a:alpha val="43137"/>
-                    </a:srgbClr>
-                  </a:outerShdw>
-                </a:effectLst>
-                <a:latin typeface="Calibri" panose="020F0502020204030204" pitchFamily="34" charset="0"/>
-              </a:rPr>
-              <a:t>ANFODERUNGSANALYSE</a:t>
-            </a:r>
-            <a:endParaRPr lang="de-AT" sz="2800" b="1" dirty="0">
-              <a:effectLst>
-                <a:outerShdw blurRad="38100" dist="38100" dir="2700000" algn="tl">
-                  <a:srgbClr val="000000">
-                    <a:alpha val="43137"/>
-                  </a:srgbClr>
-                </a:outerShdw>
-              </a:effectLst>
               <a:latin typeface="Calibri" panose="020F0502020204030204" pitchFamily="34" charset="0"/>
             </a:endParaRPr>
           </a:p>
@@ -4029,7 +4333,7 @@
         </p:nvSpPr>
         <p:spPr bwMode="auto">
           <a:xfrm>
-            <a:off x="425324" y="1817357"/>
+            <a:off x="863848" y="1817357"/>
             <a:ext cx="6695951" cy="2700300"/>
           </a:xfrm>
           <a:prstGeom prst="rect">
@@ -4183,10 +4487,71 @@
               </a:rPr>
               <a:t>UI​</a:t>
             </a:r>
-            <a:endParaRPr lang="de-AT" sz="1600" b="1" dirty="0" smtClean="0">
+          </a:p>
+        </p:txBody>
+      </p:sp>
+      <p:sp>
+        <p:nvSpPr>
+          <p:cNvPr id="8" name="Text Box 12"/>
+          <p:cNvSpPr txBox="1">
+            <a:spLocks noChangeArrowheads="1"/>
+          </p:cNvSpPr>
+          <p:nvPr/>
+        </p:nvSpPr>
+        <p:spPr bwMode="auto">
+          <a:xfrm>
+            <a:off x="863848" y="251917"/>
+            <a:ext cx="4824536" cy="699828"/>
+          </a:xfrm>
+          <a:prstGeom prst="rect">
+            <a:avLst/>
+          </a:prstGeom>
+          <a:solidFill>
+            <a:srgbClr val="099BDD"/>
+          </a:solidFill>
+          <a:ln w="9525">
+            <a:noFill/>
+            <a:miter lim="800000"/>
+            <a:headEnd/>
+            <a:tailEnd/>
+          </a:ln>
+        </p:spPr>
+        <p:txBody>
+          <a:bodyPr lIns="0" rIns="0" anchor="ctr"/>
+          <a:lstStyle/>
+          <a:p>
+            <a:pPr>
+              <a:spcBef>
+                <a:spcPts val="600"/>
+              </a:spcBef>
+            </a:pPr>
+            <a:r>
+              <a:rPr lang="de-DE" sz="2800" b="1" dirty="0" smtClean="0">
+                <a:solidFill>
+                  <a:schemeClr val="tx1"/>
+                </a:solidFill>
+                <a:effectLst>
+                  <a:outerShdw blurRad="38100" dist="38100" dir="2700000" algn="tl">
+                    <a:srgbClr val="000000">
+                      <a:alpha val="43137"/>
+                    </a:srgbClr>
+                  </a:outerShdw>
+                </a:effectLst>
+                <a:latin typeface="Calibri" panose="020F0502020204030204" pitchFamily="34" charset="0"/>
+              </a:rPr>
+              <a:t>Anforderungsanalyse</a:t>
+            </a:r>
+            <a:endParaRPr lang="de-DE" sz="2800" b="1" dirty="0">
               <a:solidFill>
-                <a:schemeClr val="bg2"/>
+                <a:schemeClr val="tx1"/>
               </a:solidFill>
+              <a:effectLst>
+                <a:outerShdw blurRad="38100" dist="38100" dir="2700000" algn="tl">
+                  <a:srgbClr val="000000">
+                    <a:alpha val="43137"/>
+                  </a:srgbClr>
+                </a:outerShdw>
+              </a:effectLst>
               <a:latin typeface="Calibri" panose="020F0502020204030204" pitchFamily="34" charset="0"/>
             </a:endParaRPr>
           </a:p>
@@ -4194,7 +4559,7 @@
       </p:sp>
       <p:pic>
         <p:nvPicPr>
-          <p:cNvPr id="1026" name="Picture 2" descr="Profile"/>
+          <p:cNvPr id="1027" name="Picture 3" descr="Basislayout"/>
           <p:cNvPicPr>
             <a:picLocks noChangeAspect="1" noChangeArrowheads="1"/>
           </p:cNvPicPr>
@@ -4215,8 +4580,8 @@
         </p:blipFill>
         <p:spPr bwMode="auto">
           <a:xfrm>
-            <a:off x="4918615" y="1901657"/>
-            <a:ext cx="4442418" cy="2623418"/>
+            <a:off x="4933943" y="1858045"/>
+            <a:ext cx="4554977" cy="2686269"/>
           </a:xfrm>
           <a:prstGeom prst="rect">
             <a:avLst/>
@@ -4294,7 +4659,7 @@
         </p:blipFill>
         <p:spPr>
           <a:xfrm>
-            <a:off x="791840" y="1039689"/>
+            <a:off x="503808" y="1039689"/>
             <a:ext cx="8211209" cy="5621461"/>
           </a:xfrm>
           <a:prstGeom prst="rect">
@@ -4302,74 +4667,6 @@
           </a:prstGeom>
         </p:spPr>
       </p:pic>
-      <p:sp>
-        <p:nvSpPr>
-          <p:cNvPr id="17" name="Wolkenförmige Legende 16"/>
-          <p:cNvSpPr/>
-          <p:nvPr/>
-        </p:nvSpPr>
-        <p:spPr>
-          <a:xfrm>
-            <a:off x="359792" y="220089"/>
-            <a:ext cx="6036031" cy="720080"/>
-          </a:xfrm>
-          <a:prstGeom prst="cloudCallout">
-            <a:avLst>
-              <a:gd name="adj1" fmla="val 11723"/>
-              <a:gd name="adj2" fmla="val 89648"/>
-            </a:avLst>
-          </a:prstGeom>
-          <a:solidFill>
-            <a:srgbClr val="99FF99"/>
-          </a:solidFill>
-        </p:spPr>
-        <p:style>
-          <a:lnRef idx="2">
-            <a:schemeClr val="accent1">
-              <a:shade val="50000"/>
-            </a:schemeClr>
-          </a:lnRef>
-          <a:fillRef idx="1">
-            <a:schemeClr val="accent1"/>
-          </a:fillRef>
-          <a:effectRef idx="0">
-            <a:schemeClr val="accent1"/>
-          </a:effectRef>
-          <a:fontRef idx="minor">
-            <a:schemeClr val="lt1"/>
-          </a:fontRef>
-        </p:style>
-        <p:txBody>
-          <a:bodyPr rtlCol="0" anchor="ctr"/>
-          <a:lstStyle/>
-          <a:p>
-            <a:pPr algn="ctr"/>
-            <a:r>
-              <a:rPr lang="de-DE" sz="2800" b="1" dirty="0" smtClean="0">
-                <a:effectLst>
-                  <a:outerShdw blurRad="38100" dist="38100" dir="2700000" algn="tl">
-                    <a:srgbClr val="000000">
-                      <a:alpha val="43137"/>
-                    </a:srgbClr>
-                  </a:outerShdw>
-                </a:effectLst>
-                <a:latin typeface="Calibri" panose="020F0502020204030204" pitchFamily="34" charset="0"/>
-              </a:rPr>
-              <a:t>USE-CASE DIAGRAMM</a:t>
-            </a:r>
-            <a:endParaRPr lang="de-AT" sz="2800" b="1" dirty="0">
-              <a:effectLst>
-                <a:outerShdw blurRad="38100" dist="38100" dir="2700000" algn="tl">
-                  <a:srgbClr val="000000">
-                    <a:alpha val="43137"/>
-                  </a:srgbClr>
-                </a:outerShdw>
-              </a:effectLst>
-              <a:latin typeface="Calibri" panose="020F0502020204030204" pitchFamily="34" charset="0"/>
-            </a:endParaRPr>
-          </a:p>
-        </p:txBody>
-      </p:sp>
       <p:sp>
         <p:nvSpPr>
           <p:cNvPr id="10" name="Foliennummernplatzhalter 3"/>
@@ -4427,6 +4724,73 @@
               <a:t>2</a:t>
             </a:fld>
             <a:endParaRPr lang="de-AT" smtClean="0">
+              <a:latin typeface="Calibri" panose="020F0502020204030204" pitchFamily="34" charset="0"/>
+            </a:endParaRPr>
+          </a:p>
+        </p:txBody>
+      </p:sp>
+      <p:sp>
+        <p:nvSpPr>
+          <p:cNvPr id="5" name="Text Box 12"/>
+          <p:cNvSpPr txBox="1">
+            <a:spLocks noChangeArrowheads="1"/>
+          </p:cNvSpPr>
+          <p:nvPr/>
+        </p:nvSpPr>
+        <p:spPr bwMode="auto">
+          <a:xfrm>
+            <a:off x="863848" y="251917"/>
+            <a:ext cx="4824536" cy="699828"/>
+          </a:xfrm>
+          <a:prstGeom prst="rect">
+            <a:avLst/>
+          </a:prstGeom>
+          <a:solidFill>
+            <a:srgbClr val="099BDD"/>
+          </a:solidFill>
+          <a:ln w="9525">
+            <a:noFill/>
+            <a:miter lim="800000"/>
+            <a:headEnd/>
+            <a:tailEnd/>
+          </a:ln>
+        </p:spPr>
+        <p:txBody>
+          <a:bodyPr lIns="0" rIns="0" anchor="ctr"/>
+          <a:lstStyle/>
+          <a:p>
+            <a:pPr>
+              <a:spcBef>
+                <a:spcPts val="600"/>
+              </a:spcBef>
+            </a:pPr>
+            <a:r>
+              <a:rPr lang="de-DE" sz="2800" b="1" dirty="0" smtClean="0">
+                <a:solidFill>
+                  <a:schemeClr val="tx1"/>
+                </a:solidFill>
+                <a:effectLst>
+                  <a:outerShdw blurRad="38100" dist="38100" dir="2700000" algn="tl">
+                    <a:srgbClr val="000000">
+                      <a:alpha val="43137"/>
+                    </a:srgbClr>
+                  </a:outerShdw>
+                </a:effectLst>
+                <a:latin typeface="Calibri" panose="020F0502020204030204" pitchFamily="34" charset="0"/>
+              </a:rPr>
+              <a:t>USE-CASE-DIAGRAMM</a:t>
+            </a:r>
+            <a:endParaRPr lang="de-DE" sz="2800" b="1" dirty="0">
+              <a:solidFill>
+                <a:schemeClr val="tx1"/>
+              </a:solidFill>
+              <a:effectLst>
+                <a:outerShdw blurRad="38100" dist="38100" dir="2700000" algn="tl">
+                  <a:srgbClr val="000000">
+                    <a:alpha val="43137"/>
+                  </a:srgbClr>
+                </a:outerShdw>
+              </a:effectLst>
               <a:latin typeface="Calibri" panose="020F0502020204030204" pitchFamily="34" charset="0"/>
             </a:endParaRPr>
           </a:p>
@@ -4471,74 +4835,6 @@
       </p:grpSpPr>
       <p:sp>
         <p:nvSpPr>
-          <p:cNvPr id="17" name="Wolkenförmige Legende 16"/>
-          <p:cNvSpPr/>
-          <p:nvPr/>
-        </p:nvSpPr>
-        <p:spPr>
-          <a:xfrm>
-            <a:off x="359792" y="220089"/>
-            <a:ext cx="6036031" cy="720080"/>
-          </a:xfrm>
-          <a:prstGeom prst="cloudCallout">
-            <a:avLst>
-              <a:gd name="adj1" fmla="val 11723"/>
-              <a:gd name="adj2" fmla="val 89648"/>
-            </a:avLst>
-          </a:prstGeom>
-          <a:solidFill>
-            <a:srgbClr val="99FF99"/>
-          </a:solidFill>
-        </p:spPr>
-        <p:style>
-          <a:lnRef idx="2">
-            <a:schemeClr val="accent1">
-              <a:shade val="50000"/>
-            </a:schemeClr>
-          </a:lnRef>
-          <a:fillRef idx="1">
-            <a:schemeClr val="accent1"/>
-          </a:fillRef>
-          <a:effectRef idx="0">
-            <a:schemeClr val="accent1"/>
-          </a:effectRef>
-          <a:fontRef idx="minor">
-            <a:schemeClr val="lt1"/>
-          </a:fontRef>
-        </p:style>
-        <p:txBody>
-          <a:bodyPr rtlCol="0" anchor="ctr"/>
-          <a:lstStyle/>
-          <a:p>
-            <a:pPr algn="ctr"/>
-            <a:r>
-              <a:rPr lang="de-DE" sz="2800" b="1" dirty="0" smtClean="0">
-                <a:effectLst>
-                  <a:outerShdw blurRad="38100" dist="38100" dir="2700000" algn="tl">
-                    <a:srgbClr val="000000">
-                      <a:alpha val="43137"/>
-                    </a:srgbClr>
-                  </a:outerShdw>
-                </a:effectLst>
-                <a:latin typeface="Calibri" panose="020F0502020204030204" pitchFamily="34" charset="0"/>
-              </a:rPr>
-              <a:t>User sperren</a:t>
-            </a:r>
-            <a:endParaRPr lang="de-AT" sz="2800" b="1" dirty="0">
-              <a:effectLst>
-                <a:outerShdw blurRad="38100" dist="38100" dir="2700000" algn="tl">
-                  <a:srgbClr val="000000">
-                    <a:alpha val="43137"/>
-                  </a:srgbClr>
-                </a:outerShdw>
-              </a:effectLst>
-              <a:latin typeface="Calibri" panose="020F0502020204030204" pitchFamily="34" charset="0"/>
-            </a:endParaRPr>
-          </a:p>
-        </p:txBody>
-      </p:sp>
-      <p:sp>
-        <p:nvSpPr>
           <p:cNvPr id="10" name="Foliennummernplatzhalter 3"/>
           <p:cNvSpPr>
             <a:spLocks noGrp="1"/>
@@ -4601,67 +4897,615 @@
       </p:sp>
       <p:sp>
         <p:nvSpPr>
-          <p:cNvPr id="3" name="Rechteck 2"/>
-          <p:cNvSpPr/>
+          <p:cNvPr id="8" name="Text Box 12"/>
+          <p:cNvSpPr txBox="1">
+            <a:spLocks noChangeArrowheads="1"/>
+          </p:cNvSpPr>
           <p:nvPr/>
         </p:nvSpPr>
+        <p:spPr bwMode="auto">
+          <a:xfrm>
+            <a:off x="863848" y="251917"/>
+            <a:ext cx="6264696" cy="699828"/>
+          </a:xfrm>
+          <a:prstGeom prst="rect">
+            <a:avLst/>
+          </a:prstGeom>
+          <a:solidFill>
+            <a:srgbClr val="099BDD"/>
+          </a:solidFill>
+          <a:ln w="9525">
+            <a:noFill/>
+            <a:miter lim="800000"/>
+            <a:headEnd/>
+            <a:tailEnd/>
+          </a:ln>
+        </p:spPr>
+        <p:txBody>
+          <a:bodyPr lIns="0" rIns="0" anchor="ctr"/>
+          <a:lstStyle/>
+          <a:p>
+            <a:pPr>
+              <a:spcBef>
+                <a:spcPts val="600"/>
+              </a:spcBef>
+            </a:pPr>
+            <a:r>
+              <a:rPr lang="de-DE" sz="2800" b="1" dirty="0" smtClean="0">
+                <a:effectLst>
+                  <a:outerShdw blurRad="38100" dist="38100" dir="2700000" algn="tl">
+                    <a:srgbClr val="000000">
+                      <a:alpha val="43137"/>
+                    </a:srgbClr>
+                  </a:outerShdw>
+                </a:effectLst>
+                <a:latin typeface="Calibri" panose="020F0502020204030204" pitchFamily="34" charset="0"/>
+              </a:rPr>
+              <a:t>Beitrag hinzufügen / </a:t>
+            </a:r>
+            <a:r>
+              <a:rPr lang="de-DE" sz="2800" b="1" dirty="0" err="1" smtClean="0">
+                <a:effectLst>
+                  <a:outerShdw blurRad="38100" dist="38100" dir="2700000" algn="tl">
+                    <a:srgbClr val="000000">
+                      <a:alpha val="43137"/>
+                    </a:srgbClr>
+                  </a:outerShdw>
+                </a:effectLst>
+                <a:latin typeface="Calibri" panose="020F0502020204030204" pitchFamily="34" charset="0"/>
+              </a:rPr>
+              <a:t>UserSeite</a:t>
+            </a:r>
+            <a:r>
+              <a:rPr lang="de-DE" sz="2800" b="1" dirty="0" smtClean="0">
+                <a:effectLst>
+                  <a:outerShdw blurRad="38100" dist="38100" dir="2700000" algn="tl">
+                    <a:srgbClr val="000000">
+                      <a:alpha val="43137"/>
+                    </a:srgbClr>
+                  </a:outerShdw>
+                </a:effectLst>
+                <a:latin typeface="Calibri" panose="020F0502020204030204" pitchFamily="34" charset="0"/>
+              </a:rPr>
+              <a:t> anschauen</a:t>
+            </a:r>
+            <a:endParaRPr lang="de-DE" sz="2800" b="1" dirty="0">
+              <a:solidFill>
+                <a:schemeClr val="tx1"/>
+              </a:solidFill>
+              <a:effectLst>
+                <a:outerShdw blurRad="38100" dist="38100" dir="2700000" algn="tl">
+                  <a:srgbClr val="000000">
+                    <a:alpha val="43137"/>
+                  </a:srgbClr>
+                </a:outerShdw>
+              </a:effectLst>
+              <a:latin typeface="Calibri" panose="020F0502020204030204" pitchFamily="34" charset="0"/>
+            </a:endParaRPr>
+          </a:p>
+        </p:txBody>
+      </p:sp>
+      <p:pic>
+        <p:nvPicPr>
+          <p:cNvPr id="6147" name="Picture 3" descr="Beitrag hinzufuegen"/>
+          <p:cNvPicPr>
+            <a:picLocks noChangeAspect="1" noChangeArrowheads="1"/>
+          </p:cNvPicPr>
+          <p:nvPr/>
+        </p:nvPicPr>
+        <p:blipFill>
+          <a:blip r:embed="rId3">
+            <a:extLst>
+              <a:ext uri="{28A0092B-C50C-407E-A947-70E740481C1C}">
+                <a14:useLocalDpi xmlns:a14="http://schemas.microsoft.com/office/drawing/2010/main" val="0"/>
+              </a:ext>
+            </a:extLst>
+          </a:blip>
+          <a:srcRect/>
+          <a:stretch>
+            <a:fillRect/>
+          </a:stretch>
+        </p:blipFill>
+        <p:spPr bwMode="auto">
+          <a:xfrm>
+            <a:off x="863848" y="1188021"/>
+            <a:ext cx="4664740" cy="2752347"/>
+          </a:xfrm>
+          <a:prstGeom prst="rect">
+            <a:avLst/>
+          </a:prstGeom>
+          <a:noFill/>
+          <a:ln>
+            <a:noFill/>
+          </a:ln>
+          <a:extLst>
+            <a:ext uri="{909E8E84-426E-40DD-AFC4-6F175D3DCCD1}">
+              <a14:hiddenFill xmlns:a14="http://schemas.microsoft.com/office/drawing/2010/main">
+                <a:solidFill>
+                  <a:srgbClr val="FFFFFF"/>
+                </a:solidFill>
+              </a14:hiddenFill>
+            </a:ext>
+            <a:ext uri="{91240B29-F687-4F45-9708-019B960494DF}">
+              <a14:hiddenLine xmlns:a14="http://schemas.microsoft.com/office/drawing/2010/main" w="9525">
+                <a:solidFill>
+                  <a:srgbClr val="000000"/>
+                </a:solidFill>
+                <a:miter lim="800000"/>
+                <a:headEnd/>
+                <a:tailEnd/>
+              </a14:hiddenLine>
+            </a:ext>
+          </a:extLst>
+        </p:spPr>
+      </p:pic>
+      <p:pic>
+        <p:nvPicPr>
+          <p:cNvPr id="6146" name="Picture 2" descr="UserSeite"/>
+          <p:cNvPicPr>
+            <a:picLocks noChangeAspect="1" noChangeArrowheads="1"/>
+          </p:cNvPicPr>
+          <p:nvPr/>
+        </p:nvPicPr>
+        <p:blipFill>
+          <a:blip r:embed="rId4">
+            <a:extLst>
+              <a:ext uri="{28A0092B-C50C-407E-A947-70E740481C1C}">
+                <a14:useLocalDpi xmlns:a14="http://schemas.microsoft.com/office/drawing/2010/main" val="0"/>
+              </a:ext>
+            </a:extLst>
+          </a:blip>
+          <a:srcRect/>
+          <a:stretch>
+            <a:fillRect/>
+          </a:stretch>
+        </p:blipFill>
+        <p:spPr bwMode="auto">
+          <a:xfrm>
+            <a:off x="4248224" y="3136873"/>
+            <a:ext cx="5364596" cy="3164174"/>
+          </a:xfrm>
+          <a:prstGeom prst="rect">
+            <a:avLst/>
+          </a:prstGeom>
+          <a:noFill/>
+          <a:ln>
+            <a:noFill/>
+          </a:ln>
+          <a:extLst>
+            <a:ext uri="{909E8E84-426E-40DD-AFC4-6F175D3DCCD1}">
+              <a14:hiddenFill xmlns:a14="http://schemas.microsoft.com/office/drawing/2010/main">
+                <a:solidFill>
+                  <a:srgbClr val="FFFFFF"/>
+                </a:solidFill>
+              </a14:hiddenFill>
+            </a:ext>
+            <a:ext uri="{91240B29-F687-4F45-9708-019B960494DF}">
+              <a14:hiddenLine xmlns:a14="http://schemas.microsoft.com/office/drawing/2010/main" w="9525">
+                <a:solidFill>
+                  <a:srgbClr val="000000"/>
+                </a:solidFill>
+                <a:miter lim="800000"/>
+                <a:headEnd/>
+                <a:tailEnd/>
+              </a14:hiddenLine>
+            </a:ext>
+          </a:extLst>
+        </p:spPr>
+      </p:pic>
+    </p:spTree>
+    <p:extLst>
+      <p:ext uri="{BB962C8B-B14F-4D97-AF65-F5344CB8AC3E}">
+        <p14:creationId xmlns:p14="http://schemas.microsoft.com/office/powerpoint/2010/main" val="1098686007"/>
+      </p:ext>
+    </p:extLst>
+  </p:cSld>
+  <p:clrMapOvr>
+    <a:masterClrMapping/>
+  </p:clrMapOvr>
+  <p:timing>
+    <p:tnLst>
+      <p:par>
+        <p:cTn id="1" dur="indefinite" restart="never" nodeType="tmRoot"/>
+      </p:par>
+    </p:tnLst>
+  </p:timing>
+</p:sld>
+</file>
+
+<file path=ppt/slides/slide4.xml><?xml version="1.0" encoding="utf-8"?>
+<p:sld xmlns:a="http://schemas.openxmlformats.org/drawingml/2006/main" xmlns:r="http://schemas.openxmlformats.org/officeDocument/2006/relationships" xmlns:p="http://schemas.openxmlformats.org/presentationml/2006/main">
+  <p:cSld>
+    <p:spTree>
+      <p:nvGrpSpPr>
+        <p:cNvPr id="1" name=""/>
+        <p:cNvGrpSpPr/>
+        <p:nvPr/>
+      </p:nvGrpSpPr>
+      <p:grpSpPr>
+        <a:xfrm>
+          <a:off x="0" y="0"/>
+          <a:ext cx="0" cy="0"/>
+          <a:chOff x="0" y="0"/>
+          <a:chExt cx="0" cy="0"/>
+        </a:xfrm>
+      </p:grpSpPr>
+      <p:sp>
+        <p:nvSpPr>
+          <p:cNvPr id="10" name="Foliennummernplatzhalter 3"/>
+          <p:cNvSpPr>
+            <a:spLocks noGrp="1"/>
+          </p:cNvSpPr>
+          <p:nvPr>
+            <p:ph type="sldNum" sz="quarter" idx="10"/>
+          </p:nvPr>
+        </p:nvSpPr>
+        <p:spPr bwMode="auto">
+          <a:xfrm>
+            <a:off x="9719940" y="6661150"/>
+            <a:ext cx="360685" cy="179388"/>
+          </a:xfrm>
+          <a:prstGeom prst="rect">
+            <a:avLst/>
+          </a:prstGeom>
+          <a:ln>
+            <a:miter lim="800000"/>
+            <a:headEnd/>
+            <a:tailEnd/>
+          </a:ln>
+        </p:spPr>
+        <p:txBody>
+          <a:bodyPr wrap="square" numCol="1" anchorCtr="0" compatLnSpc="1">
+            <a:prstTxWarp prst="textNoShape">
+              <a:avLst/>
+            </a:prstTxWarp>
+          </a:bodyPr>
+          <a:lstStyle/>
+          <a:p>
+            <a:pPr algn="ctr" fontAlgn="base">
+              <a:spcBef>
+                <a:spcPct val="0"/>
+              </a:spcBef>
+              <a:spcAft>
+                <a:spcPct val="0"/>
+              </a:spcAft>
+              <a:defRPr/>
+            </a:pPr>
+            <a:fld id="{5D6F7771-04F9-46BF-83FA-DE3BEA921C7E}" type="slidenum">
+              <a:rPr lang="de-AT" smtClean="0">
+                <a:latin typeface="Calibri" panose="020F0502020204030204" pitchFamily="34" charset="0"/>
+              </a:rPr>
+              <a:pPr algn="ctr" fontAlgn="base">
+                <a:spcBef>
+                  <a:spcPct val="0"/>
+                </a:spcBef>
+                <a:spcAft>
+                  <a:spcPct val="0"/>
+                </a:spcAft>
+                <a:defRPr/>
+              </a:pPr>
+              <a:t>4</a:t>
+            </a:fld>
+            <a:endParaRPr lang="de-AT" smtClean="0">
+              <a:latin typeface="Calibri" panose="020F0502020204030204" pitchFamily="34" charset="0"/>
+            </a:endParaRPr>
+          </a:p>
+        </p:txBody>
+      </p:sp>
+      <p:sp>
+        <p:nvSpPr>
+          <p:cNvPr id="8" name="Text Box 12"/>
+          <p:cNvSpPr txBox="1">
+            <a:spLocks noChangeArrowheads="1"/>
+          </p:cNvSpPr>
+          <p:nvPr/>
+        </p:nvSpPr>
+        <p:spPr bwMode="auto">
+          <a:xfrm>
+            <a:off x="863848" y="251917"/>
+            <a:ext cx="4824536" cy="699828"/>
+          </a:xfrm>
+          <a:prstGeom prst="rect">
+            <a:avLst/>
+          </a:prstGeom>
+          <a:solidFill>
+            <a:srgbClr val="099BDD"/>
+          </a:solidFill>
+          <a:ln w="9525">
+            <a:noFill/>
+            <a:miter lim="800000"/>
+            <a:headEnd/>
+            <a:tailEnd/>
+          </a:ln>
+        </p:spPr>
+        <p:txBody>
+          <a:bodyPr lIns="0" rIns="0" anchor="ctr"/>
+          <a:lstStyle/>
+          <a:p>
+            <a:pPr>
+              <a:spcBef>
+                <a:spcPts val="600"/>
+              </a:spcBef>
+            </a:pPr>
+            <a:r>
+              <a:rPr lang="de-DE" sz="2800" b="1" dirty="0" smtClean="0">
+                <a:effectLst>
+                  <a:outerShdw blurRad="38100" dist="38100" dir="2700000" algn="tl">
+                    <a:srgbClr val="000000">
+                      <a:alpha val="43137"/>
+                    </a:srgbClr>
+                  </a:outerShdw>
+                </a:effectLst>
+                <a:latin typeface="Calibri" panose="020F0502020204030204" pitchFamily="34" charset="0"/>
+              </a:rPr>
+              <a:t>Beitrag mit Stichwort suchen</a:t>
+            </a:r>
+            <a:endParaRPr lang="de-DE" sz="2800" b="1" dirty="0">
+              <a:solidFill>
+                <a:schemeClr val="tx1"/>
+              </a:solidFill>
+              <a:effectLst>
+                <a:outerShdw blurRad="38100" dist="38100" dir="2700000" algn="tl">
+                  <a:srgbClr val="000000">
+                    <a:alpha val="43137"/>
+                  </a:srgbClr>
+                </a:outerShdw>
+              </a:effectLst>
+              <a:latin typeface="Calibri" panose="020F0502020204030204" pitchFamily="34" charset="0"/>
+            </a:endParaRPr>
+          </a:p>
+        </p:txBody>
+      </p:sp>
+      <p:pic>
+        <p:nvPicPr>
+          <p:cNvPr id="4098" name="Picture 2" descr="Stichwort PW"/>
+          <p:cNvPicPr>
+            <a:picLocks noChangeAspect="1" noChangeArrowheads="1"/>
+          </p:cNvPicPr>
+          <p:nvPr/>
+        </p:nvPicPr>
+        <p:blipFill>
+          <a:blip r:embed="rId3">
+            <a:extLst>
+              <a:ext uri="{28A0092B-C50C-407E-A947-70E740481C1C}">
+                <a14:useLocalDpi xmlns:a14="http://schemas.microsoft.com/office/drawing/2010/main" val="0"/>
+              </a:ext>
+            </a:extLst>
+          </a:blip>
+          <a:srcRect/>
+          <a:stretch>
+            <a:fillRect/>
+          </a:stretch>
+        </p:blipFill>
+        <p:spPr bwMode="auto">
+          <a:xfrm>
+            <a:off x="863848" y="1332037"/>
+            <a:ext cx="8333295" cy="4935252"/>
+          </a:xfrm>
+          <a:prstGeom prst="rect">
+            <a:avLst/>
+          </a:prstGeom>
+          <a:noFill/>
+          <a:ln>
+            <a:noFill/>
+          </a:ln>
+          <a:extLst>
+            <a:ext uri="{909E8E84-426E-40DD-AFC4-6F175D3DCCD1}">
+              <a14:hiddenFill xmlns:a14="http://schemas.microsoft.com/office/drawing/2010/main">
+                <a:solidFill>
+                  <a:srgbClr val="FFFFFF"/>
+                </a:solidFill>
+              </a14:hiddenFill>
+            </a:ext>
+            <a:ext uri="{91240B29-F687-4F45-9708-019B960494DF}">
+              <a14:hiddenLine xmlns:a14="http://schemas.microsoft.com/office/drawing/2010/main" w="9525">
+                <a:solidFill>
+                  <a:srgbClr val="000000"/>
+                </a:solidFill>
+                <a:miter lim="800000"/>
+                <a:headEnd/>
+                <a:tailEnd/>
+              </a14:hiddenLine>
+            </a:ext>
+          </a:extLst>
+        </p:spPr>
+      </p:pic>
+    </p:spTree>
+    <p:extLst>
+      <p:ext uri="{BB962C8B-B14F-4D97-AF65-F5344CB8AC3E}">
+        <p14:creationId xmlns:p14="http://schemas.microsoft.com/office/powerpoint/2010/main" val="3952401835"/>
+      </p:ext>
+    </p:extLst>
+  </p:cSld>
+  <p:clrMapOvr>
+    <a:masterClrMapping/>
+  </p:clrMapOvr>
+  <p:timing>
+    <p:tnLst>
+      <p:par>
+        <p:cTn id="1" dur="indefinite" restart="never" nodeType="tmRoot"/>
+      </p:par>
+    </p:tnLst>
+  </p:timing>
+</p:sld>
+</file>
+
+<file path=ppt/slides/slide5.xml><?xml version="1.0" encoding="utf-8"?>
+<p:sld xmlns:a="http://schemas.openxmlformats.org/drawingml/2006/main" xmlns:r="http://schemas.openxmlformats.org/officeDocument/2006/relationships" xmlns:p="http://schemas.openxmlformats.org/presentationml/2006/main">
+  <p:cSld>
+    <p:spTree>
+      <p:nvGrpSpPr>
+        <p:cNvPr id="1" name=""/>
+        <p:cNvGrpSpPr/>
+        <p:nvPr/>
+      </p:nvGrpSpPr>
+      <p:grpSpPr>
+        <a:xfrm>
+          <a:off x="0" y="0"/>
+          <a:ext cx="0" cy="0"/>
+          <a:chOff x="0" y="0"/>
+          <a:chExt cx="0" cy="0"/>
+        </a:xfrm>
+      </p:grpSpPr>
+      <p:sp>
+        <p:nvSpPr>
+          <p:cNvPr id="10" name="Foliennummernplatzhalter 3"/>
+          <p:cNvSpPr>
+            <a:spLocks noGrp="1"/>
+          </p:cNvSpPr>
+          <p:nvPr>
+            <p:ph type="sldNum" sz="quarter" idx="10"/>
+          </p:nvPr>
+        </p:nvSpPr>
+        <p:spPr bwMode="auto">
+          <a:xfrm>
+            <a:off x="9719940" y="6661150"/>
+            <a:ext cx="360685" cy="179388"/>
+          </a:xfrm>
+          <a:prstGeom prst="rect">
+            <a:avLst/>
+          </a:prstGeom>
+          <a:ln>
+            <a:miter lim="800000"/>
+            <a:headEnd/>
+            <a:tailEnd/>
+          </a:ln>
+        </p:spPr>
+        <p:txBody>
+          <a:bodyPr wrap="square" numCol="1" anchorCtr="0" compatLnSpc="1">
+            <a:prstTxWarp prst="textNoShape">
+              <a:avLst/>
+            </a:prstTxWarp>
+          </a:bodyPr>
+          <a:lstStyle/>
+          <a:p>
+            <a:pPr algn="ctr" fontAlgn="base">
+              <a:spcBef>
+                <a:spcPct val="0"/>
+              </a:spcBef>
+              <a:spcAft>
+                <a:spcPct val="0"/>
+              </a:spcAft>
+              <a:defRPr/>
+            </a:pPr>
+            <a:fld id="{5D6F7771-04F9-46BF-83FA-DE3BEA921C7E}" type="slidenum">
+              <a:rPr lang="de-AT" smtClean="0">
+                <a:latin typeface="Calibri" panose="020F0502020204030204" pitchFamily="34" charset="0"/>
+              </a:rPr>
+              <a:pPr algn="ctr" fontAlgn="base">
+                <a:spcBef>
+                  <a:spcPct val="0"/>
+                </a:spcBef>
+                <a:spcAft>
+                  <a:spcPct val="0"/>
+                </a:spcAft>
+                <a:defRPr/>
+              </a:pPr>
+              <a:t>5</a:t>
+            </a:fld>
+            <a:endParaRPr lang="de-AT" smtClean="0">
+              <a:latin typeface="Calibri" panose="020F0502020204030204" pitchFamily="34" charset="0"/>
+            </a:endParaRPr>
+          </a:p>
+        </p:txBody>
+      </p:sp>
+      <p:sp>
+        <p:nvSpPr>
+          <p:cNvPr id="8" name="Text Box 12"/>
+          <p:cNvSpPr txBox="1">
+            <a:spLocks noChangeArrowheads="1"/>
+          </p:cNvSpPr>
+          <p:nvPr/>
+        </p:nvSpPr>
+        <p:spPr bwMode="auto">
+          <a:xfrm>
+            <a:off x="863848" y="251917"/>
+            <a:ext cx="5256584" cy="699828"/>
+          </a:xfrm>
+          <a:prstGeom prst="rect">
+            <a:avLst/>
+          </a:prstGeom>
+          <a:solidFill>
+            <a:srgbClr val="099BDD"/>
+          </a:solidFill>
+          <a:ln w="9525">
+            <a:noFill/>
+            <a:miter lim="800000"/>
+            <a:headEnd/>
+            <a:tailEnd/>
+          </a:ln>
+        </p:spPr>
+        <p:txBody>
+          <a:bodyPr lIns="0" rIns="0" anchor="ctr"/>
+          <a:lstStyle/>
+          <a:p>
+            <a:pPr>
+              <a:spcBef>
+                <a:spcPts val="600"/>
+              </a:spcBef>
+            </a:pPr>
+            <a:r>
+              <a:rPr lang="de-DE" sz="2800" b="1" dirty="0" smtClean="0">
+                <a:solidFill>
+                  <a:schemeClr val="tx1"/>
+                </a:solidFill>
+                <a:effectLst>
+                  <a:outerShdw blurRad="38100" dist="38100" dir="2700000" algn="tl">
+                    <a:srgbClr val="000000">
+                      <a:alpha val="43137"/>
+                    </a:srgbClr>
+                  </a:outerShdw>
+                </a:effectLst>
+                <a:latin typeface="Calibri" panose="020F0502020204030204" pitchFamily="34" charset="0"/>
+              </a:rPr>
+              <a:t>Beitrag melden / prüfen / löschen</a:t>
+            </a:r>
+            <a:endParaRPr lang="de-DE" sz="2800" b="1" dirty="0">
+              <a:solidFill>
+                <a:schemeClr val="tx1"/>
+              </a:solidFill>
+              <a:effectLst>
+                <a:outerShdw blurRad="38100" dist="38100" dir="2700000" algn="tl">
+                  <a:srgbClr val="000000">
+                    <a:alpha val="43137"/>
+                  </a:srgbClr>
+                </a:outerShdw>
+              </a:effectLst>
+              <a:latin typeface="Calibri" panose="020F0502020204030204" pitchFamily="34" charset="0"/>
+            </a:endParaRPr>
+          </a:p>
+        </p:txBody>
+      </p:sp>
+      <p:pic>
+        <p:nvPicPr>
+          <p:cNvPr id="3" name="Grafik 2"/>
+          <p:cNvPicPr>
+            <a:picLocks noChangeAspect="1"/>
+          </p:cNvPicPr>
+          <p:nvPr/>
+        </p:nvPicPr>
+        <p:blipFill>
+          <a:blip r:embed="rId3">
+            <a:extLst>
+              <a:ext uri="{28A0092B-C50C-407E-A947-70E740481C1C}">
+                <a14:useLocalDpi xmlns:a14="http://schemas.microsoft.com/office/drawing/2010/main" val="0"/>
+              </a:ext>
+            </a:extLst>
+          </a:blip>
+          <a:stretch>
+            <a:fillRect/>
+          </a:stretch>
+        </p:blipFill>
         <p:spPr>
           <a:xfrm>
-            <a:off x="503808" y="4620502"/>
-            <a:ext cx="7867923" cy="369332"/>
+            <a:off x="287784" y="1182006"/>
+            <a:ext cx="4899287" cy="2892350"/>
           </a:xfrm>
           <a:prstGeom prst="rect">
             <a:avLst/>
           </a:prstGeom>
         </p:spPr>
-        <p:txBody>
-          <a:bodyPr wrap="none">
-            <a:spAutoFit/>
-          </a:bodyPr>
-          <a:lstStyle/>
-          <a:p>
-            <a:pPr marL="342900" lvl="0" indent="-342900" algn="ctr">
-              <a:spcBef>
-                <a:spcPct val="20000"/>
-              </a:spcBef>
-              <a:defRPr/>
-            </a:pPr>
-            <a:r>
-              <a:rPr lang="de-DE" b="1" dirty="0" smtClean="0">
-                <a:solidFill>
-                  <a:srgbClr val="FF0000"/>
-                </a:solidFill>
-                <a:latin typeface="Calibri" panose="020F0502020204030204" pitchFamily="34" charset="0"/>
-              </a:rPr>
-              <a:t>Hier kommt das oder mehrere UI &amp; ev. Ausschnitt aus dem </a:t>
-            </a:r>
-            <a:r>
-              <a:rPr lang="de-DE" b="1" dirty="0" err="1" smtClean="0">
-                <a:solidFill>
-                  <a:srgbClr val="FF0000"/>
-                </a:solidFill>
-                <a:latin typeface="Calibri" panose="020F0502020204030204" pitchFamily="34" charset="0"/>
-              </a:rPr>
-              <a:t>Use</a:t>
-            </a:r>
-            <a:r>
-              <a:rPr lang="de-DE" b="1" dirty="0" smtClean="0">
-                <a:solidFill>
-                  <a:srgbClr val="FF0000"/>
-                </a:solidFill>
-                <a:latin typeface="Calibri" panose="020F0502020204030204" pitchFamily="34" charset="0"/>
-              </a:rPr>
-              <a:t>-Case Diagramm</a:t>
-            </a:r>
-            <a:endParaRPr lang="de-DE" b="1" dirty="0">
-              <a:solidFill>
-                <a:srgbClr val="FF0000"/>
-              </a:solidFill>
-              <a:latin typeface="Calibri" panose="020F0502020204030204" pitchFamily="34" charset="0"/>
-            </a:endParaRPr>
-          </a:p>
-        </p:txBody>
-      </p:sp>
+      </p:pic>
       <p:pic>
         <p:nvPicPr>
           <p:cNvPr id="4" name="Grafik 3"/>
@@ -4671,15 +5515,51 @@
           <p:nvPr/>
         </p:nvPicPr>
         <p:blipFill>
-          <a:blip r:embed="rId3"/>
+          <a:blip r:embed="rId4">
+            <a:extLst>
+              <a:ext uri="{28A0092B-C50C-407E-A947-70E740481C1C}">
+                <a14:useLocalDpi xmlns:a14="http://schemas.microsoft.com/office/drawing/2010/main" val="0"/>
+              </a:ext>
+            </a:extLst>
+          </a:blip>
           <a:stretch>
             <a:fillRect/>
           </a:stretch>
         </p:blipFill>
         <p:spPr>
           <a:xfrm>
-            <a:off x="2746111" y="1332037"/>
-            <a:ext cx="7299424" cy="2896597"/>
+            <a:off x="4320232" y="1319604"/>
+            <a:ext cx="5082245" cy="3000362"/>
+          </a:xfrm>
+          <a:prstGeom prst="rect">
+            <a:avLst/>
+          </a:prstGeom>
+        </p:spPr>
+      </p:pic>
+      <p:pic>
+        <p:nvPicPr>
+          <p:cNvPr id="2" name="Grafik 1"/>
+          <p:cNvPicPr>
+            <a:picLocks noChangeAspect="1"/>
+          </p:cNvPicPr>
+          <p:nvPr/>
+        </p:nvPicPr>
+        <p:blipFill>
+          <a:blip r:embed="rId5">
+            <a:extLst>
+              <a:ext uri="{28A0092B-C50C-407E-A947-70E740481C1C}">
+                <a14:useLocalDpi xmlns:a14="http://schemas.microsoft.com/office/drawing/2010/main" val="0"/>
+              </a:ext>
+            </a:extLst>
+          </a:blip>
+          <a:stretch>
+            <a:fillRect/>
+          </a:stretch>
+        </p:blipFill>
+        <p:spPr>
+          <a:xfrm>
+            <a:off x="2087984" y="3492277"/>
+            <a:ext cx="5112568" cy="3018264"/>
           </a:xfrm>
           <a:prstGeom prst="rect">
             <a:avLst/>
@@ -4689,7 +5569,447 @@
     </p:spTree>
     <p:extLst>
       <p:ext uri="{BB962C8B-B14F-4D97-AF65-F5344CB8AC3E}">
-        <p14:creationId xmlns:p14="http://schemas.microsoft.com/office/powerpoint/2010/main" val="1507386943"/>
+        <p14:creationId xmlns:p14="http://schemas.microsoft.com/office/powerpoint/2010/main" val="1867309700"/>
+      </p:ext>
+    </p:extLst>
+  </p:cSld>
+  <p:clrMapOvr>
+    <a:masterClrMapping/>
+  </p:clrMapOvr>
+  <p:timing>
+    <p:tnLst>
+      <p:par>
+        <p:cTn id="1" dur="indefinite" restart="never" nodeType="tmRoot"/>
+      </p:par>
+    </p:tnLst>
+  </p:timing>
+</p:sld>
+</file>
+
+<file path=ppt/slides/slide6.xml><?xml version="1.0" encoding="utf-8"?>
+<p:sld xmlns:a="http://schemas.openxmlformats.org/drawingml/2006/main" xmlns:r="http://schemas.openxmlformats.org/officeDocument/2006/relationships" xmlns:p="http://schemas.openxmlformats.org/presentationml/2006/main">
+  <p:cSld>
+    <p:spTree>
+      <p:nvGrpSpPr>
+        <p:cNvPr id="1" name=""/>
+        <p:cNvGrpSpPr/>
+        <p:nvPr/>
+      </p:nvGrpSpPr>
+      <p:grpSpPr>
+        <a:xfrm>
+          <a:off x="0" y="0"/>
+          <a:ext cx="0" cy="0"/>
+          <a:chOff x="0" y="0"/>
+          <a:chExt cx="0" cy="0"/>
+        </a:xfrm>
+      </p:grpSpPr>
+      <p:sp>
+        <p:nvSpPr>
+          <p:cNvPr id="10" name="Foliennummernplatzhalter 3"/>
+          <p:cNvSpPr>
+            <a:spLocks noGrp="1"/>
+          </p:cNvSpPr>
+          <p:nvPr>
+            <p:ph type="sldNum" sz="quarter" idx="10"/>
+          </p:nvPr>
+        </p:nvSpPr>
+        <p:spPr bwMode="auto">
+          <a:xfrm>
+            <a:off x="9719940" y="6661150"/>
+            <a:ext cx="360685" cy="179388"/>
+          </a:xfrm>
+          <a:prstGeom prst="rect">
+            <a:avLst/>
+          </a:prstGeom>
+          <a:ln>
+            <a:miter lim="800000"/>
+            <a:headEnd/>
+            <a:tailEnd/>
+          </a:ln>
+        </p:spPr>
+        <p:txBody>
+          <a:bodyPr wrap="square" numCol="1" anchorCtr="0" compatLnSpc="1">
+            <a:prstTxWarp prst="textNoShape">
+              <a:avLst/>
+            </a:prstTxWarp>
+          </a:bodyPr>
+          <a:lstStyle/>
+          <a:p>
+            <a:pPr algn="ctr" fontAlgn="base">
+              <a:spcBef>
+                <a:spcPct val="0"/>
+              </a:spcBef>
+              <a:spcAft>
+                <a:spcPct val="0"/>
+              </a:spcAft>
+              <a:defRPr/>
+            </a:pPr>
+            <a:fld id="{5D6F7771-04F9-46BF-83FA-DE3BEA921C7E}" type="slidenum">
+              <a:rPr lang="de-AT" smtClean="0">
+                <a:latin typeface="Calibri" panose="020F0502020204030204" pitchFamily="34" charset="0"/>
+              </a:rPr>
+              <a:pPr algn="ctr" fontAlgn="base">
+                <a:spcBef>
+                  <a:spcPct val="0"/>
+                </a:spcBef>
+                <a:spcAft>
+                  <a:spcPct val="0"/>
+                </a:spcAft>
+                <a:defRPr/>
+              </a:pPr>
+              <a:t>6</a:t>
+            </a:fld>
+            <a:endParaRPr lang="de-AT" smtClean="0">
+              <a:latin typeface="Calibri" panose="020F0502020204030204" pitchFamily="34" charset="0"/>
+            </a:endParaRPr>
+          </a:p>
+        </p:txBody>
+      </p:sp>
+      <p:sp>
+        <p:nvSpPr>
+          <p:cNvPr id="8" name="Text Box 12"/>
+          <p:cNvSpPr txBox="1">
+            <a:spLocks noChangeArrowheads="1"/>
+          </p:cNvSpPr>
+          <p:nvPr/>
+        </p:nvSpPr>
+        <p:spPr bwMode="auto">
+          <a:xfrm>
+            <a:off x="863848" y="251917"/>
+            <a:ext cx="4824536" cy="699828"/>
+          </a:xfrm>
+          <a:prstGeom prst="rect">
+            <a:avLst/>
+          </a:prstGeom>
+          <a:solidFill>
+            <a:srgbClr val="099BDD"/>
+          </a:solidFill>
+          <a:ln w="9525">
+            <a:noFill/>
+            <a:miter lim="800000"/>
+            <a:headEnd/>
+            <a:tailEnd/>
+          </a:ln>
+        </p:spPr>
+        <p:txBody>
+          <a:bodyPr lIns="0" rIns="0" anchor="ctr"/>
+          <a:lstStyle/>
+          <a:p>
+            <a:pPr>
+              <a:spcBef>
+                <a:spcPts val="600"/>
+              </a:spcBef>
+            </a:pPr>
+            <a:r>
+              <a:rPr lang="de-DE" sz="2800" b="1" dirty="0" smtClean="0">
+                <a:solidFill>
+                  <a:schemeClr val="tx1"/>
+                </a:solidFill>
+                <a:effectLst>
+                  <a:outerShdw blurRad="38100" dist="38100" dir="2700000" algn="tl">
+                    <a:srgbClr val="000000">
+                      <a:alpha val="43137"/>
+                    </a:srgbClr>
+                  </a:outerShdw>
+                </a:effectLst>
+                <a:latin typeface="Calibri" panose="020F0502020204030204" pitchFamily="34" charset="0"/>
+              </a:rPr>
+              <a:t>User sperren</a:t>
+            </a:r>
+            <a:endParaRPr lang="de-DE" sz="2800" b="1" dirty="0">
+              <a:solidFill>
+                <a:schemeClr val="tx1"/>
+              </a:solidFill>
+              <a:effectLst>
+                <a:outerShdw blurRad="38100" dist="38100" dir="2700000" algn="tl">
+                  <a:srgbClr val="000000">
+                    <a:alpha val="43137"/>
+                  </a:srgbClr>
+                </a:outerShdw>
+              </a:effectLst>
+              <a:latin typeface="Calibri" panose="020F0502020204030204" pitchFamily="34" charset="0"/>
+            </a:endParaRPr>
+          </a:p>
+        </p:txBody>
+      </p:sp>
+      <p:pic>
+        <p:nvPicPr>
+          <p:cNvPr id="3074" name="Picture 2" descr="User sperren"/>
+          <p:cNvPicPr>
+            <a:picLocks noChangeAspect="1" noChangeArrowheads="1"/>
+          </p:cNvPicPr>
+          <p:nvPr/>
+        </p:nvPicPr>
+        <p:blipFill>
+          <a:blip r:embed="rId3">
+            <a:extLst>
+              <a:ext uri="{28A0092B-C50C-407E-A947-70E740481C1C}">
+                <a14:useLocalDpi xmlns:a14="http://schemas.microsoft.com/office/drawing/2010/main" val="0"/>
+              </a:ext>
+            </a:extLst>
+          </a:blip>
+          <a:srcRect/>
+          <a:stretch>
+            <a:fillRect/>
+          </a:stretch>
+        </p:blipFill>
+        <p:spPr bwMode="auto">
+          <a:xfrm>
+            <a:off x="863848" y="1332037"/>
+            <a:ext cx="8336939" cy="4916656"/>
+          </a:xfrm>
+          <a:prstGeom prst="rect">
+            <a:avLst/>
+          </a:prstGeom>
+          <a:noFill/>
+          <a:ln>
+            <a:noFill/>
+          </a:ln>
+          <a:extLst>
+            <a:ext uri="{909E8E84-426E-40DD-AFC4-6F175D3DCCD1}">
+              <a14:hiddenFill xmlns:a14="http://schemas.microsoft.com/office/drawing/2010/main">
+                <a:solidFill>
+                  <a:srgbClr val="FFFFFF"/>
+                </a:solidFill>
+              </a14:hiddenFill>
+            </a:ext>
+            <a:ext uri="{91240B29-F687-4F45-9708-019B960494DF}">
+              <a14:hiddenLine xmlns:a14="http://schemas.microsoft.com/office/drawing/2010/main" w="9525">
+                <a:solidFill>
+                  <a:srgbClr val="000000"/>
+                </a:solidFill>
+                <a:miter lim="800000"/>
+                <a:headEnd/>
+                <a:tailEnd/>
+              </a14:hiddenLine>
+            </a:ext>
+          </a:extLst>
+        </p:spPr>
+      </p:pic>
+    </p:spTree>
+    <p:extLst>
+      <p:ext uri="{BB962C8B-B14F-4D97-AF65-F5344CB8AC3E}">
+        <p14:creationId xmlns:p14="http://schemas.microsoft.com/office/powerpoint/2010/main" val="1799963517"/>
+      </p:ext>
+    </p:extLst>
+  </p:cSld>
+  <p:clrMapOvr>
+    <a:masterClrMapping/>
+  </p:clrMapOvr>
+  <p:timing>
+    <p:tnLst>
+      <p:par>
+        <p:cTn id="1" dur="indefinite" restart="never" nodeType="tmRoot"/>
+      </p:par>
+    </p:tnLst>
+  </p:timing>
+</p:sld>
+</file>
+
+<file path=ppt/slides/slide7.xml><?xml version="1.0" encoding="utf-8"?>
+<p:sld xmlns:a="http://schemas.openxmlformats.org/drawingml/2006/main" xmlns:r="http://schemas.openxmlformats.org/officeDocument/2006/relationships" xmlns:p="http://schemas.openxmlformats.org/presentationml/2006/main">
+  <p:cSld>
+    <p:spTree>
+      <p:nvGrpSpPr>
+        <p:cNvPr id="1" name=""/>
+        <p:cNvGrpSpPr/>
+        <p:nvPr/>
+      </p:nvGrpSpPr>
+      <p:grpSpPr>
+        <a:xfrm>
+          <a:off x="0" y="0"/>
+          <a:ext cx="0" cy="0"/>
+          <a:chOff x="0" y="0"/>
+          <a:chExt cx="0" cy="0"/>
+        </a:xfrm>
+      </p:grpSpPr>
+      <p:sp>
+        <p:nvSpPr>
+          <p:cNvPr id="10" name="Foliennummernplatzhalter 3"/>
+          <p:cNvSpPr>
+            <a:spLocks noGrp="1"/>
+          </p:cNvSpPr>
+          <p:nvPr>
+            <p:ph type="sldNum" sz="quarter" idx="10"/>
+          </p:nvPr>
+        </p:nvSpPr>
+        <p:spPr bwMode="auto">
+          <a:xfrm>
+            <a:off x="9719940" y="6661150"/>
+            <a:ext cx="360685" cy="179388"/>
+          </a:xfrm>
+          <a:prstGeom prst="rect">
+            <a:avLst/>
+          </a:prstGeom>
+          <a:ln>
+            <a:miter lim="800000"/>
+            <a:headEnd/>
+            <a:tailEnd/>
+          </a:ln>
+        </p:spPr>
+        <p:txBody>
+          <a:bodyPr wrap="square" numCol="1" anchorCtr="0" compatLnSpc="1">
+            <a:prstTxWarp prst="textNoShape">
+              <a:avLst/>
+            </a:prstTxWarp>
+          </a:bodyPr>
+          <a:lstStyle/>
+          <a:p>
+            <a:pPr algn="ctr" fontAlgn="base">
+              <a:spcBef>
+                <a:spcPct val="0"/>
+              </a:spcBef>
+              <a:spcAft>
+                <a:spcPct val="0"/>
+              </a:spcAft>
+              <a:defRPr/>
+            </a:pPr>
+            <a:fld id="{5D6F7771-04F9-46BF-83FA-DE3BEA921C7E}" type="slidenum">
+              <a:rPr lang="de-AT" smtClean="0">
+                <a:latin typeface="Calibri" panose="020F0502020204030204" pitchFamily="34" charset="0"/>
+              </a:rPr>
+              <a:pPr algn="ctr" fontAlgn="base">
+                <a:spcBef>
+                  <a:spcPct val="0"/>
+                </a:spcBef>
+                <a:spcAft>
+                  <a:spcPct val="0"/>
+                </a:spcAft>
+                <a:defRPr/>
+              </a:pPr>
+              <a:t>7</a:t>
+            </a:fld>
+            <a:endParaRPr lang="de-AT" smtClean="0">
+              <a:latin typeface="Calibri" panose="020F0502020204030204" pitchFamily="34" charset="0"/>
+            </a:endParaRPr>
+          </a:p>
+        </p:txBody>
+      </p:sp>
+      <p:pic>
+        <p:nvPicPr>
+          <p:cNvPr id="2051" name="Picture 3" descr="Statistik"/>
+          <p:cNvPicPr>
+            <a:picLocks noChangeAspect="1" noChangeArrowheads="1"/>
+          </p:cNvPicPr>
+          <p:nvPr/>
+        </p:nvPicPr>
+        <p:blipFill>
+          <a:blip r:embed="rId3">
+            <a:extLst>
+              <a:ext uri="{28A0092B-C50C-407E-A947-70E740481C1C}">
+                <a14:useLocalDpi xmlns:a14="http://schemas.microsoft.com/office/drawing/2010/main" val="0"/>
+              </a:ext>
+            </a:extLst>
+          </a:blip>
+          <a:srcRect/>
+          <a:stretch>
+            <a:fillRect/>
+          </a:stretch>
+        </p:blipFill>
+        <p:spPr bwMode="auto">
+          <a:xfrm>
+            <a:off x="697611" y="1260029"/>
+            <a:ext cx="8352928" cy="4934290"/>
+          </a:xfrm>
+          <a:prstGeom prst="rect">
+            <a:avLst/>
+          </a:prstGeom>
+          <a:noFill/>
+          <a:ln>
+            <a:noFill/>
+          </a:ln>
+          <a:extLst>
+            <a:ext uri="{909E8E84-426E-40DD-AFC4-6F175D3DCCD1}">
+              <a14:hiddenFill xmlns:a14="http://schemas.microsoft.com/office/drawing/2010/main">
+                <a:solidFill>
+                  <a:srgbClr val="FFFFFF"/>
+                </a:solidFill>
+              </a14:hiddenFill>
+            </a:ext>
+            <a:ext uri="{91240B29-F687-4F45-9708-019B960494DF}">
+              <a14:hiddenLine xmlns:a14="http://schemas.microsoft.com/office/drawing/2010/main" w="9525">
+                <a:solidFill>
+                  <a:srgbClr val="000000"/>
+                </a:solidFill>
+                <a:miter lim="800000"/>
+                <a:headEnd/>
+                <a:tailEnd/>
+              </a14:hiddenLine>
+            </a:ext>
+          </a:extLst>
+        </p:spPr>
+      </p:pic>
+      <p:sp>
+        <p:nvSpPr>
+          <p:cNvPr id="8" name="Text Box 12"/>
+          <p:cNvSpPr txBox="1">
+            <a:spLocks noChangeArrowheads="1"/>
+          </p:cNvSpPr>
+          <p:nvPr/>
+        </p:nvSpPr>
+        <p:spPr bwMode="auto">
+          <a:xfrm>
+            <a:off x="863848" y="251917"/>
+            <a:ext cx="4824536" cy="699828"/>
+          </a:xfrm>
+          <a:prstGeom prst="rect">
+            <a:avLst/>
+          </a:prstGeom>
+          <a:solidFill>
+            <a:srgbClr val="099BDD"/>
+          </a:solidFill>
+          <a:ln w="9525">
+            <a:noFill/>
+            <a:miter lim="800000"/>
+            <a:headEnd/>
+            <a:tailEnd/>
+          </a:ln>
+        </p:spPr>
+        <p:txBody>
+          <a:bodyPr lIns="0" rIns="0" anchor="ctr"/>
+          <a:lstStyle/>
+          <a:p>
+            <a:pPr>
+              <a:spcBef>
+                <a:spcPts val="600"/>
+              </a:spcBef>
+            </a:pPr>
+            <a:r>
+              <a:rPr lang="de-DE" sz="2800" b="1" dirty="0" smtClean="0">
+                <a:solidFill>
+                  <a:schemeClr val="tx1"/>
+                </a:solidFill>
+                <a:effectLst>
+                  <a:outerShdw blurRad="38100" dist="38100" dir="2700000" algn="tl">
+                    <a:srgbClr val="000000">
+                      <a:alpha val="43137"/>
+                    </a:srgbClr>
+                  </a:outerShdw>
+                </a:effectLst>
+                <a:latin typeface="Calibri" panose="020F0502020204030204" pitchFamily="34" charset="0"/>
+              </a:rPr>
+              <a:t>Statistik auswerten</a:t>
+            </a:r>
+            <a:endParaRPr lang="de-DE" sz="2800" b="1" dirty="0">
+              <a:solidFill>
+                <a:schemeClr val="tx1"/>
+              </a:solidFill>
+              <a:effectLst>
+                <a:outerShdw blurRad="38100" dist="38100" dir="2700000" algn="tl">
+                  <a:srgbClr val="000000">
+                    <a:alpha val="43137"/>
+                  </a:srgbClr>
+                </a:outerShdw>
+              </a:effectLst>
+              <a:latin typeface="Calibri" panose="020F0502020204030204" pitchFamily="34" charset="0"/>
+            </a:endParaRPr>
+          </a:p>
+        </p:txBody>
+      </p:sp>
+    </p:spTree>
+    <p:extLst>
+      <p:ext uri="{BB962C8B-B14F-4D97-AF65-F5344CB8AC3E}">
+        <p14:creationId xmlns:p14="http://schemas.microsoft.com/office/powerpoint/2010/main" val="1972958059"/>
       </p:ext>
     </p:extLst>
   </p:cSld>

</xml_diff>